<commit_message>
Layout: added crossword grid, MAX_GRID, etc
</commit_message>
<xml_diff>
--- a/res/src.pptx
+++ b/res/src.pptx
@@ -8,6 +8,7 @@
     <p:sldId id="256" r:id="rId2"/>
     <p:sldId id="257" r:id="rId3"/>
     <p:sldId id="258" r:id="rId4"/>
+    <p:sldId id="259" r:id="rId5"/>
   </p:sldIdLst>
   <p:sldSz cx="12192000" cy="6858000"/>
   <p:notesSz cx="6858000" cy="9144000"/>
@@ -4370,10 +4371,1603 @@
           </a:p>
         </p:txBody>
       </p:sp>
+      <p:pic>
+        <p:nvPicPr>
+          <p:cNvPr id="10" name="Picture 9">
+            <a:extLst>
+              <a:ext uri="{FF2B5EF4-FFF2-40B4-BE49-F238E27FC236}">
+                <a16:creationId xmlns:a16="http://schemas.microsoft.com/office/drawing/2014/main" id="{E78C9FBD-809D-4C54-94B0-52B811B8C953}"/>
+              </a:ext>
+            </a:extLst>
+          </p:cNvPr>
+          <p:cNvPicPr>
+            <a:picLocks noChangeAspect="1"/>
+          </p:cNvPicPr>
+          <p:nvPr/>
+        </p:nvPicPr>
+        <p:blipFill>
+          <a:blip r:embed="rId4">
+            <a:extLst>
+              <a:ext uri="{28A0092B-C50C-407E-A947-70E740481C1C}">
+                <a14:useLocalDpi xmlns:a14="http://schemas.microsoft.com/office/drawing/2010/main" val="0"/>
+              </a:ext>
+            </a:extLst>
+          </a:blip>
+          <a:stretch>
+            <a:fillRect/>
+          </a:stretch>
+        </p:blipFill>
+        <p:spPr>
+          <a:xfrm>
+            <a:off x="863633" y="4592723"/>
+            <a:ext cx="810996" cy="1070590"/>
+          </a:xfrm>
+          <a:prstGeom prst="rect">
+            <a:avLst/>
+          </a:prstGeom>
+        </p:spPr>
+      </p:pic>
+      <p:pic>
+        <p:nvPicPr>
+          <p:cNvPr id="11" name="Picture 10">
+            <a:extLst>
+              <a:ext uri="{FF2B5EF4-FFF2-40B4-BE49-F238E27FC236}">
+                <a16:creationId xmlns:a16="http://schemas.microsoft.com/office/drawing/2014/main" id="{06272AB4-9F85-453A-906C-AADE7CC71A2E}"/>
+              </a:ext>
+            </a:extLst>
+          </p:cNvPr>
+          <p:cNvPicPr>
+            <a:picLocks noChangeAspect="1"/>
+          </p:cNvPicPr>
+          <p:nvPr/>
+        </p:nvPicPr>
+        <p:blipFill>
+          <a:blip r:embed="rId5">
+            <a:extLst>
+              <a:ext uri="{28A0092B-C50C-407E-A947-70E740481C1C}">
+                <a14:useLocalDpi xmlns:a14="http://schemas.microsoft.com/office/drawing/2010/main" val="0"/>
+              </a:ext>
+            </a:extLst>
+          </a:blip>
+          <a:stretch>
+            <a:fillRect/>
+          </a:stretch>
+        </p:blipFill>
+        <p:spPr>
+          <a:xfrm>
+            <a:off x="1904960" y="4592723"/>
+            <a:ext cx="496450" cy="1068694"/>
+          </a:xfrm>
+          <a:prstGeom prst="rect">
+            <a:avLst/>
+          </a:prstGeom>
+        </p:spPr>
+      </p:pic>
+      <p:pic>
+        <p:nvPicPr>
+          <p:cNvPr id="12" name="Picture 11">
+            <a:extLst>
+              <a:ext uri="{FF2B5EF4-FFF2-40B4-BE49-F238E27FC236}">
+                <a16:creationId xmlns:a16="http://schemas.microsoft.com/office/drawing/2014/main" id="{340590DF-9B13-436E-BD7B-2619C5291D9B}"/>
+              </a:ext>
+            </a:extLst>
+          </p:cNvPr>
+          <p:cNvPicPr>
+            <a:picLocks noChangeAspect="1"/>
+          </p:cNvPicPr>
+          <p:nvPr/>
+        </p:nvPicPr>
+        <p:blipFill>
+          <a:blip r:embed="rId6">
+            <a:extLst>
+              <a:ext uri="{28A0092B-C50C-407E-A947-70E740481C1C}">
+                <a14:useLocalDpi xmlns:a14="http://schemas.microsoft.com/office/drawing/2010/main" val="0"/>
+              </a:ext>
+            </a:extLst>
+          </a:blip>
+          <a:stretch>
+            <a:fillRect/>
+          </a:stretch>
+        </p:blipFill>
+        <p:spPr>
+          <a:xfrm>
+            <a:off x="2631741" y="4592723"/>
+            <a:ext cx="204644" cy="1068696"/>
+          </a:xfrm>
+          <a:prstGeom prst="rect">
+            <a:avLst/>
+          </a:prstGeom>
+        </p:spPr>
+      </p:pic>
+      <p:pic>
+        <p:nvPicPr>
+          <p:cNvPr id="13" name="Picture 12">
+            <a:extLst>
+              <a:ext uri="{FF2B5EF4-FFF2-40B4-BE49-F238E27FC236}">
+                <a16:creationId xmlns:a16="http://schemas.microsoft.com/office/drawing/2014/main" id="{1C942118-B2FA-47BA-B5C6-F5C83A4D372E}"/>
+              </a:ext>
+            </a:extLst>
+          </p:cNvPr>
+          <p:cNvPicPr>
+            <a:picLocks noChangeAspect="1"/>
+          </p:cNvPicPr>
+          <p:nvPr/>
+        </p:nvPicPr>
+        <p:blipFill>
+          <a:blip r:embed="rId7">
+            <a:extLst>
+              <a:ext uri="{28A0092B-C50C-407E-A947-70E740481C1C}">
+                <a14:useLocalDpi xmlns:a14="http://schemas.microsoft.com/office/drawing/2010/main" val="0"/>
+              </a:ext>
+            </a:extLst>
+          </a:blip>
+          <a:stretch>
+            <a:fillRect/>
+          </a:stretch>
+        </p:blipFill>
+        <p:spPr>
+          <a:xfrm>
+            <a:off x="3066716" y="4592723"/>
+            <a:ext cx="496450" cy="1068694"/>
+          </a:xfrm>
+          <a:prstGeom prst="rect">
+            <a:avLst/>
+          </a:prstGeom>
+        </p:spPr>
+      </p:pic>
+      <p:pic>
+        <p:nvPicPr>
+          <p:cNvPr id="14" name="Picture 13">
+            <a:extLst>
+              <a:ext uri="{FF2B5EF4-FFF2-40B4-BE49-F238E27FC236}">
+                <a16:creationId xmlns:a16="http://schemas.microsoft.com/office/drawing/2014/main" id="{3CA280CC-72E2-470F-9C09-C46923809F2B}"/>
+              </a:ext>
+            </a:extLst>
+          </p:cNvPr>
+          <p:cNvPicPr>
+            <a:picLocks noChangeAspect="1"/>
+          </p:cNvPicPr>
+          <p:nvPr/>
+        </p:nvPicPr>
+        <p:blipFill>
+          <a:blip r:embed="rId8">
+            <a:extLst>
+              <a:ext uri="{28A0092B-C50C-407E-A947-70E740481C1C}">
+                <a14:useLocalDpi xmlns:a14="http://schemas.microsoft.com/office/drawing/2010/main" val="0"/>
+              </a:ext>
+            </a:extLst>
+          </a:blip>
+          <a:stretch>
+            <a:fillRect/>
+          </a:stretch>
+        </p:blipFill>
+        <p:spPr>
+          <a:xfrm>
+            <a:off x="3793497" y="4592723"/>
+            <a:ext cx="810996" cy="1070590"/>
+          </a:xfrm>
+          <a:prstGeom prst="rect">
+            <a:avLst/>
+          </a:prstGeom>
+        </p:spPr>
+      </p:pic>
+      <p:pic>
+        <p:nvPicPr>
+          <p:cNvPr id="15" name="Picture 14">
+            <a:extLst>
+              <a:ext uri="{FF2B5EF4-FFF2-40B4-BE49-F238E27FC236}">
+                <a16:creationId xmlns:a16="http://schemas.microsoft.com/office/drawing/2014/main" id="{A8962ED8-5552-427E-A4EC-5C04321925AD}"/>
+              </a:ext>
+            </a:extLst>
+          </p:cNvPr>
+          <p:cNvPicPr>
+            <a:picLocks noChangeAspect="1"/>
+          </p:cNvPicPr>
+          <p:nvPr/>
+        </p:nvPicPr>
+        <p:blipFill>
+          <a:blip r:embed="rId9">
+            <a:extLst>
+              <a:ext uri="{28A0092B-C50C-407E-A947-70E740481C1C}">
+                <a14:useLocalDpi xmlns:a14="http://schemas.microsoft.com/office/drawing/2010/main" val="0"/>
+              </a:ext>
+            </a:extLst>
+          </a:blip>
+          <a:stretch>
+            <a:fillRect/>
+          </a:stretch>
+        </p:blipFill>
+        <p:spPr>
+          <a:xfrm>
+            <a:off x="4834824" y="4594617"/>
+            <a:ext cx="953110" cy="1068696"/>
+          </a:xfrm>
+          <a:prstGeom prst="rect">
+            <a:avLst/>
+          </a:prstGeom>
+        </p:spPr>
+      </p:pic>
+      <p:pic>
+        <p:nvPicPr>
+          <p:cNvPr id="16" name="Picture 15">
+            <a:extLst>
+              <a:ext uri="{FF2B5EF4-FFF2-40B4-BE49-F238E27FC236}">
+                <a16:creationId xmlns:a16="http://schemas.microsoft.com/office/drawing/2014/main" id="{A28FE932-C582-4E19-BC4D-F88575B7C824}"/>
+              </a:ext>
+            </a:extLst>
+          </p:cNvPr>
+          <p:cNvPicPr>
+            <a:picLocks noChangeAspect="1"/>
+          </p:cNvPicPr>
+          <p:nvPr/>
+        </p:nvPicPr>
+        <p:blipFill>
+          <a:blip r:embed="rId10">
+            <a:extLst>
+              <a:ext uri="{28A0092B-C50C-407E-A947-70E740481C1C}">
+                <a14:useLocalDpi xmlns:a14="http://schemas.microsoft.com/office/drawing/2010/main" val="0"/>
+              </a:ext>
+            </a:extLst>
+          </a:blip>
+          <a:stretch>
+            <a:fillRect/>
+          </a:stretch>
+        </p:blipFill>
+        <p:spPr>
+          <a:xfrm>
+            <a:off x="6018265" y="4594617"/>
+            <a:ext cx="1059222" cy="1068696"/>
+          </a:xfrm>
+          <a:prstGeom prst="rect">
+            <a:avLst/>
+          </a:prstGeom>
+        </p:spPr>
+      </p:pic>
+      <p:pic>
+        <p:nvPicPr>
+          <p:cNvPr id="17" name="Picture 16">
+            <a:extLst>
+              <a:ext uri="{FF2B5EF4-FFF2-40B4-BE49-F238E27FC236}">
+                <a16:creationId xmlns:a16="http://schemas.microsoft.com/office/drawing/2014/main" id="{B249A736-93FC-45C2-B87A-CDC71108F160}"/>
+              </a:ext>
+            </a:extLst>
+          </p:cNvPr>
+          <p:cNvPicPr>
+            <a:picLocks noChangeAspect="1"/>
+          </p:cNvPicPr>
+          <p:nvPr/>
+        </p:nvPicPr>
+        <p:blipFill>
+          <a:blip r:embed="rId11">
+            <a:extLst>
+              <a:ext uri="{28A0092B-C50C-407E-A947-70E740481C1C}">
+                <a14:useLocalDpi xmlns:a14="http://schemas.microsoft.com/office/drawing/2010/main" val="0"/>
+              </a:ext>
+            </a:extLst>
+          </a:blip>
+          <a:stretch>
+            <a:fillRect/>
+          </a:stretch>
+        </p:blipFill>
+        <p:spPr>
+          <a:xfrm>
+            <a:off x="7304676" y="4594617"/>
+            <a:ext cx="1066802" cy="1068696"/>
+          </a:xfrm>
+          <a:prstGeom prst="rect">
+            <a:avLst/>
+          </a:prstGeom>
+        </p:spPr>
+      </p:pic>
+      <p:pic>
+        <p:nvPicPr>
+          <p:cNvPr id="18" name="Picture 17">
+            <a:extLst>
+              <a:ext uri="{FF2B5EF4-FFF2-40B4-BE49-F238E27FC236}">
+                <a16:creationId xmlns:a16="http://schemas.microsoft.com/office/drawing/2014/main" id="{75C0E2DD-5A5E-4A0A-B81E-E1876BCD5EB6}"/>
+              </a:ext>
+            </a:extLst>
+          </p:cNvPr>
+          <p:cNvPicPr>
+            <a:picLocks noChangeAspect="1"/>
+          </p:cNvPicPr>
+          <p:nvPr/>
+        </p:nvPicPr>
+        <p:blipFill>
+          <a:blip r:embed="rId12">
+            <a:extLst>
+              <a:ext uri="{28A0092B-C50C-407E-A947-70E740481C1C}">
+                <a14:useLocalDpi xmlns:a14="http://schemas.microsoft.com/office/drawing/2010/main" val="0"/>
+              </a:ext>
+            </a:extLst>
+          </a:blip>
+          <a:stretch>
+            <a:fillRect/>
+          </a:stretch>
+        </p:blipFill>
+        <p:spPr>
+          <a:xfrm>
+            <a:off x="8598667" y="4594617"/>
+            <a:ext cx="1059222" cy="1068696"/>
+          </a:xfrm>
+          <a:prstGeom prst="rect">
+            <a:avLst/>
+          </a:prstGeom>
+        </p:spPr>
+      </p:pic>
+      <p:pic>
+        <p:nvPicPr>
+          <p:cNvPr id="19" name="Picture 18">
+            <a:extLst>
+              <a:ext uri="{FF2B5EF4-FFF2-40B4-BE49-F238E27FC236}">
+                <a16:creationId xmlns:a16="http://schemas.microsoft.com/office/drawing/2014/main" id="{A481E113-F1A4-4670-97A9-18E3B2B8C586}"/>
+              </a:ext>
+            </a:extLst>
+          </p:cNvPr>
+          <p:cNvPicPr>
+            <a:picLocks noChangeAspect="1"/>
+          </p:cNvPicPr>
+          <p:nvPr/>
+        </p:nvPicPr>
+        <p:blipFill>
+          <a:blip r:embed="rId13">
+            <a:extLst>
+              <a:ext uri="{28A0092B-C50C-407E-A947-70E740481C1C}">
+                <a14:useLocalDpi xmlns:a14="http://schemas.microsoft.com/office/drawing/2010/main" val="0"/>
+              </a:ext>
+            </a:extLst>
+          </a:blip>
+          <a:stretch>
+            <a:fillRect/>
+          </a:stretch>
+        </p:blipFill>
+        <p:spPr>
+          <a:xfrm>
+            <a:off x="9885078" y="4592723"/>
+            <a:ext cx="955004" cy="1068694"/>
+          </a:xfrm>
+          <a:prstGeom prst="rect">
+            <a:avLst/>
+          </a:prstGeom>
+        </p:spPr>
+      </p:pic>
+      <p:sp>
+        <p:nvSpPr>
+          <p:cNvPr id="2" name="TextBox 1">
+            <a:extLst>
+              <a:ext uri="{FF2B5EF4-FFF2-40B4-BE49-F238E27FC236}">
+                <a16:creationId xmlns:a16="http://schemas.microsoft.com/office/drawing/2014/main" id="{51D7FFC7-815D-4970-8C8A-77299FF396D3}"/>
+              </a:ext>
+            </a:extLst>
+          </p:cNvPr>
+          <p:cNvSpPr txBox="1"/>
+          <p:nvPr/>
+        </p:nvSpPr>
+        <p:spPr>
+          <a:xfrm>
+            <a:off x="863633" y="4020853"/>
+            <a:ext cx="9894568" cy="369332"/>
+          </a:xfrm>
+          <a:prstGeom prst="rect">
+            <a:avLst/>
+          </a:prstGeom>
+          <a:noFill/>
+        </p:spPr>
+        <p:txBody>
+          <a:bodyPr wrap="none" rtlCol="0">
+            <a:spAutoFit/>
+          </a:bodyPr>
+          <a:lstStyle/>
+          <a:p>
+            <a:r>
+              <a:rPr lang="en-IN" dirty="0"/>
+              <a:t>Coin Sprite sheet (converted to 30x30 animated gif with 100 milliseconds animation delay, loop forever)</a:t>
+            </a:r>
+          </a:p>
+        </p:txBody>
+      </p:sp>
+      <p:sp>
+        <p:nvSpPr>
+          <p:cNvPr id="20" name="TextBox 19">
+            <a:extLst>
+              <a:ext uri="{FF2B5EF4-FFF2-40B4-BE49-F238E27FC236}">
+                <a16:creationId xmlns:a16="http://schemas.microsoft.com/office/drawing/2014/main" id="{38FAEA2E-8A98-4D1D-AA2E-C914F8450C3D}"/>
+              </a:ext>
+            </a:extLst>
+          </p:cNvPr>
+          <p:cNvSpPr txBox="1"/>
+          <p:nvPr/>
+        </p:nvSpPr>
+        <p:spPr>
+          <a:xfrm>
+            <a:off x="4906120" y="3447089"/>
+            <a:ext cx="5863913" cy="369332"/>
+          </a:xfrm>
+          <a:prstGeom prst="rect">
+            <a:avLst/>
+          </a:prstGeom>
+          <a:noFill/>
+        </p:spPr>
+        <p:txBody>
+          <a:bodyPr wrap="none" rtlCol="0">
+            <a:spAutoFit/>
+          </a:bodyPr>
+          <a:lstStyle/>
+          <a:p>
+            <a:r>
+              <a:rPr lang="en-IN" dirty="0"/>
+              <a:t>Source: </a:t>
+            </a:r>
+            <a:r>
+              <a:rPr lang="en-IN" dirty="0">
+                <a:hlinkClick r:id="rId14"/>
+              </a:rPr>
+              <a:t>https://opengameart.org/content/game-coins-sprite</a:t>
+            </a:r>
+            <a:endParaRPr lang="en-IN" dirty="0"/>
+          </a:p>
+        </p:txBody>
+      </p:sp>
+      <p:sp>
+        <p:nvSpPr>
+          <p:cNvPr id="21" name="TextBox 20">
+            <a:extLst>
+              <a:ext uri="{FF2B5EF4-FFF2-40B4-BE49-F238E27FC236}">
+                <a16:creationId xmlns:a16="http://schemas.microsoft.com/office/drawing/2014/main" id="{69BA4912-55CB-4EA3-AAF2-E296E0F12DA3}"/>
+              </a:ext>
+            </a:extLst>
+          </p:cNvPr>
+          <p:cNvSpPr txBox="1"/>
+          <p:nvPr/>
+        </p:nvSpPr>
+        <p:spPr>
+          <a:xfrm>
+            <a:off x="4906120" y="3136252"/>
+            <a:ext cx="2891754" cy="369332"/>
+          </a:xfrm>
+          <a:prstGeom prst="rect">
+            <a:avLst/>
+          </a:prstGeom>
+          <a:noFill/>
+        </p:spPr>
+        <p:txBody>
+          <a:bodyPr wrap="none" rtlCol="0">
+            <a:spAutoFit/>
+          </a:bodyPr>
+          <a:lstStyle/>
+          <a:p>
+            <a:r>
+              <a:rPr lang="en-IN" dirty="0"/>
+              <a:t>Author:  </a:t>
+            </a:r>
+            <a:r>
+              <a:rPr lang="en-IN" dirty="0">
+                <a:hlinkClick r:id="rId15"/>
+              </a:rPr>
+              <a:t>https://craftpix.net/</a:t>
+            </a:r>
+            <a:endParaRPr lang="en-IN" dirty="0"/>
+          </a:p>
+        </p:txBody>
+      </p:sp>
+      <p:sp>
+        <p:nvSpPr>
+          <p:cNvPr id="22" name="Rectangle 21">
+            <a:extLst>
+              <a:ext uri="{FF2B5EF4-FFF2-40B4-BE49-F238E27FC236}">
+                <a16:creationId xmlns:a16="http://schemas.microsoft.com/office/drawing/2014/main" id="{C8D7D973-37CA-402F-A70A-DBAA5E44997B}"/>
+              </a:ext>
+            </a:extLst>
+          </p:cNvPr>
+          <p:cNvSpPr/>
+          <p:nvPr/>
+        </p:nvSpPr>
+        <p:spPr>
+          <a:xfrm>
+            <a:off x="5679159" y="1022953"/>
+            <a:ext cx="6096000" cy="923330"/>
+          </a:xfrm>
+          <a:prstGeom prst="rect">
+            <a:avLst/>
+          </a:prstGeom>
+        </p:spPr>
+        <p:txBody>
+          <a:bodyPr>
+            <a:spAutoFit/>
+          </a:bodyPr>
+          <a:lstStyle/>
+          <a:p>
+            <a:r>
+              <a:rPr lang="en-IN" dirty="0"/>
+              <a:t>Source: </a:t>
+            </a:r>
+            <a:r>
+              <a:rPr lang="en-IN" dirty="0">
+                <a:hlinkClick r:id="rId16"/>
+              </a:rPr>
+              <a:t>https://www.freepngimg.com/png/58348-alarm-icon-cartoon-timer-clock-free-photo-png</a:t>
+            </a:r>
+            <a:endParaRPr lang="en-IN" dirty="0"/>
+          </a:p>
+          <a:p>
+            <a:r>
+              <a:rPr lang="en-IN" dirty="0"/>
+              <a:t>Author: </a:t>
+            </a:r>
+            <a:r>
+              <a:rPr lang="en-IN" dirty="0">
+                <a:hlinkClick r:id="rId16"/>
+              </a:rPr>
+              <a:t>https://www.freepngimg.com/</a:t>
+            </a:r>
+            <a:endParaRPr lang="en-IN" dirty="0"/>
+          </a:p>
+        </p:txBody>
+      </p:sp>
+      <p:pic>
+        <p:nvPicPr>
+          <p:cNvPr id="23" name="Picture 22">
+            <a:extLst>
+              <a:ext uri="{FF2B5EF4-FFF2-40B4-BE49-F238E27FC236}">
+                <a16:creationId xmlns:a16="http://schemas.microsoft.com/office/drawing/2014/main" id="{0786E2A1-0019-4600-9860-497FBC74EBB5}"/>
+              </a:ext>
+            </a:extLst>
+          </p:cNvPr>
+          <p:cNvPicPr>
+            <a:picLocks noChangeAspect="1"/>
+          </p:cNvPicPr>
+          <p:nvPr/>
+        </p:nvPicPr>
+        <p:blipFill>
+          <a:blip r:embed="rId17">
+            <a:extLst>
+              <a:ext uri="{28A0092B-C50C-407E-A947-70E740481C1C}">
+                <a14:useLocalDpi xmlns:a14="http://schemas.microsoft.com/office/drawing/2010/main" val="0"/>
+              </a:ext>
+            </a:extLst>
+          </a:blip>
+          <a:stretch>
+            <a:fillRect/>
+          </a:stretch>
+        </p:blipFill>
+        <p:spPr>
+          <a:xfrm>
+            <a:off x="3901056" y="609287"/>
+            <a:ext cx="1511010" cy="1750663"/>
+          </a:xfrm>
+          <a:prstGeom prst="rect">
+            <a:avLst/>
+          </a:prstGeom>
+        </p:spPr>
+      </p:pic>
+      <p:pic>
+        <p:nvPicPr>
+          <p:cNvPr id="24" name="Picture 23">
+            <a:extLst>
+              <a:ext uri="{FF2B5EF4-FFF2-40B4-BE49-F238E27FC236}">
+                <a16:creationId xmlns:a16="http://schemas.microsoft.com/office/drawing/2014/main" id="{EE4C5933-4DAA-45A2-BF6A-DF69286BD4FE}"/>
+              </a:ext>
+            </a:extLst>
+          </p:cNvPr>
+          <p:cNvPicPr>
+            <a:picLocks noChangeAspect="1"/>
+          </p:cNvPicPr>
+          <p:nvPr/>
+        </p:nvPicPr>
+        <p:blipFill>
+          <a:blip r:embed="rId17">
+            <a:extLst>
+              <a:ext uri="{28A0092B-C50C-407E-A947-70E740481C1C}">
+                <a14:useLocalDpi xmlns:a14="http://schemas.microsoft.com/office/drawing/2010/main" val="0"/>
+              </a:ext>
+            </a:extLst>
+          </a:blip>
+          <a:stretch>
+            <a:fillRect/>
+          </a:stretch>
+        </p:blipFill>
+        <p:spPr>
+          <a:xfrm>
+            <a:off x="10185431" y="1810917"/>
+            <a:ext cx="354297" cy="410490"/>
+          </a:xfrm>
+          <a:prstGeom prst="rect">
+            <a:avLst/>
+          </a:prstGeom>
+        </p:spPr>
+      </p:pic>
     </p:spTree>
     <p:extLst>
       <p:ext uri="{BB962C8B-B14F-4D97-AF65-F5344CB8AC3E}">
         <p14:creationId xmlns:p14="http://schemas.microsoft.com/office/powerpoint/2010/main" val="17897208"/>
+      </p:ext>
+    </p:extLst>
+  </p:cSld>
+  <p:clrMapOvr>
+    <a:masterClrMapping/>
+  </p:clrMapOvr>
+</p:sld>
+</file>
+
+<file path=ppt/slides/slide4.xml><?xml version="1.0" encoding="utf-8"?>
+<p:sld xmlns:a="http://schemas.openxmlformats.org/drawingml/2006/main" xmlns:r="http://schemas.openxmlformats.org/officeDocument/2006/relationships" xmlns:p="http://schemas.openxmlformats.org/presentationml/2006/main">
+  <p:cSld>
+    <p:spTree>
+      <p:nvGrpSpPr>
+        <p:cNvPr id="1" name=""/>
+        <p:cNvGrpSpPr/>
+        <p:nvPr/>
+      </p:nvGrpSpPr>
+      <p:grpSpPr>
+        <a:xfrm>
+          <a:off x="0" y="0"/>
+          <a:ext cx="0" cy="0"/>
+          <a:chOff x="0" y="0"/>
+          <a:chExt cx="0" cy="0"/>
+        </a:xfrm>
+      </p:grpSpPr>
+      <p:sp>
+        <p:nvSpPr>
+          <p:cNvPr id="2" name="Rectangle 1">
+            <a:extLst>
+              <a:ext uri="{FF2B5EF4-FFF2-40B4-BE49-F238E27FC236}">
+                <a16:creationId xmlns:a16="http://schemas.microsoft.com/office/drawing/2014/main" id="{04D80E75-7A4D-464E-B9D5-CB6EBABB36E9}"/>
+              </a:ext>
+            </a:extLst>
+          </p:cNvPr>
+          <p:cNvSpPr/>
+          <p:nvPr/>
+        </p:nvSpPr>
+        <p:spPr>
+          <a:xfrm>
+            <a:off x="697583" y="803635"/>
+            <a:ext cx="4572000" cy="5250730"/>
+          </a:xfrm>
+          <a:prstGeom prst="rect">
+            <a:avLst/>
+          </a:prstGeom>
+          <a:solidFill>
+            <a:schemeClr val="accent1">
+              <a:alpha val="50000"/>
+            </a:schemeClr>
+          </a:solidFill>
+          <a:ln>
+            <a:noFill/>
+          </a:ln>
+        </p:spPr>
+        <p:style>
+          <a:lnRef idx="0">
+            <a:scrgbClr r="0" g="0" b="0"/>
+          </a:lnRef>
+          <a:fillRef idx="0">
+            <a:scrgbClr r="0" g="0" b="0"/>
+          </a:fillRef>
+          <a:effectRef idx="0">
+            <a:scrgbClr r="0" g="0" b="0"/>
+          </a:effectRef>
+          <a:fontRef idx="minor">
+            <a:schemeClr val="lt1"/>
+          </a:fontRef>
+        </p:style>
+        <p:txBody>
+          <a:bodyPr rtlCol="0" anchor="ctr"/>
+          <a:lstStyle/>
+          <a:p>
+            <a:pPr algn="ctr"/>
+            <a:r>
+              <a:rPr lang="en-IN" dirty="0"/>
+              <a:t>CROSS WORD AREA</a:t>
+            </a:r>
+          </a:p>
+        </p:txBody>
+      </p:sp>
+      <p:sp>
+        <p:nvSpPr>
+          <p:cNvPr id="3" name="Rectangle 2">
+            <a:extLst>
+              <a:ext uri="{FF2B5EF4-FFF2-40B4-BE49-F238E27FC236}">
+                <a16:creationId xmlns:a16="http://schemas.microsoft.com/office/drawing/2014/main" id="{BC16E028-211F-4D3A-AEDF-5ED6B4B11F65}"/>
+              </a:ext>
+            </a:extLst>
+          </p:cNvPr>
+          <p:cNvSpPr/>
+          <p:nvPr/>
+        </p:nvSpPr>
+        <p:spPr>
+          <a:xfrm>
+            <a:off x="697583" y="5715000"/>
+            <a:ext cx="4572000" cy="325224"/>
+          </a:xfrm>
+          <a:prstGeom prst="rect">
+            <a:avLst/>
+          </a:prstGeom>
+        </p:spPr>
+        <p:style>
+          <a:lnRef idx="2">
+            <a:schemeClr val="accent6">
+              <a:shade val="50000"/>
+            </a:schemeClr>
+          </a:lnRef>
+          <a:fillRef idx="1">
+            <a:schemeClr val="accent6"/>
+          </a:fillRef>
+          <a:effectRef idx="0">
+            <a:schemeClr val="accent6"/>
+          </a:effectRef>
+          <a:fontRef idx="minor">
+            <a:schemeClr val="lt1"/>
+          </a:fontRef>
+        </p:style>
+        <p:txBody>
+          <a:bodyPr rtlCol="0" anchor="ctr"/>
+          <a:lstStyle/>
+          <a:p>
+            <a:pPr algn="r"/>
+            <a:r>
+              <a:rPr lang="en-IN" dirty="0"/>
+              <a:t>STATUS STUFF</a:t>
+            </a:r>
+          </a:p>
+        </p:txBody>
+      </p:sp>
+      <p:sp>
+        <p:nvSpPr>
+          <p:cNvPr id="4" name="Rectangle 3">
+            <a:extLst>
+              <a:ext uri="{FF2B5EF4-FFF2-40B4-BE49-F238E27FC236}">
+                <a16:creationId xmlns:a16="http://schemas.microsoft.com/office/drawing/2014/main" id="{232B51CB-DE0B-40A5-A883-63762CA87DE3}"/>
+              </a:ext>
+            </a:extLst>
+          </p:cNvPr>
+          <p:cNvSpPr/>
+          <p:nvPr/>
+        </p:nvSpPr>
+        <p:spPr>
+          <a:xfrm>
+            <a:off x="3007149" y="803635"/>
+            <a:ext cx="2262433" cy="560895"/>
+          </a:xfrm>
+          <a:prstGeom prst="rect">
+            <a:avLst/>
+          </a:prstGeom>
+        </p:spPr>
+        <p:style>
+          <a:lnRef idx="2">
+            <a:schemeClr val="accent2">
+              <a:shade val="50000"/>
+            </a:schemeClr>
+          </a:lnRef>
+          <a:fillRef idx="1">
+            <a:schemeClr val="accent2"/>
+          </a:fillRef>
+          <a:effectRef idx="0">
+            <a:schemeClr val="accent2"/>
+          </a:effectRef>
+          <a:fontRef idx="minor">
+            <a:schemeClr val="lt1"/>
+          </a:fontRef>
+        </p:style>
+        <p:txBody>
+          <a:bodyPr rtlCol="0" anchor="ctr"/>
+          <a:lstStyle/>
+          <a:p>
+            <a:pPr algn="ctr"/>
+            <a:r>
+              <a:rPr lang="en-IN" dirty="0"/>
+              <a:t>TIME DISPLAY</a:t>
+            </a:r>
+          </a:p>
+        </p:txBody>
+      </p:sp>
+      <p:sp>
+        <p:nvSpPr>
+          <p:cNvPr id="5" name="Rectangle 4">
+            <a:extLst>
+              <a:ext uri="{FF2B5EF4-FFF2-40B4-BE49-F238E27FC236}">
+                <a16:creationId xmlns:a16="http://schemas.microsoft.com/office/drawing/2014/main" id="{1E935D0A-C606-4402-9DB8-BC9E9D610784}"/>
+              </a:ext>
+            </a:extLst>
+          </p:cNvPr>
+          <p:cNvSpPr/>
+          <p:nvPr/>
+        </p:nvSpPr>
+        <p:spPr>
+          <a:xfrm>
+            <a:off x="697583" y="803635"/>
+            <a:ext cx="2309567" cy="560895"/>
+          </a:xfrm>
+          <a:prstGeom prst="rect">
+            <a:avLst/>
+          </a:prstGeom>
+        </p:spPr>
+        <p:style>
+          <a:lnRef idx="2">
+            <a:schemeClr val="accent3">
+              <a:shade val="50000"/>
+            </a:schemeClr>
+          </a:lnRef>
+          <a:fillRef idx="1">
+            <a:schemeClr val="accent3"/>
+          </a:fillRef>
+          <a:effectRef idx="0">
+            <a:schemeClr val="accent3"/>
+          </a:effectRef>
+          <a:fontRef idx="minor">
+            <a:schemeClr val="lt1"/>
+          </a:fontRef>
+        </p:style>
+        <p:txBody>
+          <a:bodyPr rtlCol="0" anchor="ctr"/>
+          <a:lstStyle/>
+          <a:p>
+            <a:pPr algn="ctr"/>
+            <a:r>
+              <a:rPr lang="en-IN" dirty="0"/>
+              <a:t>COIN DISPLAY</a:t>
+            </a:r>
+          </a:p>
+        </p:txBody>
+      </p:sp>
+      <p:sp>
+        <p:nvSpPr>
+          <p:cNvPr id="6" name="Rectangle 5">
+            <a:extLst>
+              <a:ext uri="{FF2B5EF4-FFF2-40B4-BE49-F238E27FC236}">
+                <a16:creationId xmlns:a16="http://schemas.microsoft.com/office/drawing/2014/main" id="{9A87D718-00EC-4590-BD25-C8232B6CF888}"/>
+              </a:ext>
+            </a:extLst>
+          </p:cNvPr>
+          <p:cNvSpPr/>
+          <p:nvPr/>
+        </p:nvSpPr>
+        <p:spPr>
+          <a:xfrm>
+            <a:off x="697581" y="5715001"/>
+            <a:ext cx="1244339" cy="325224"/>
+          </a:xfrm>
+          <a:prstGeom prst="rect">
+            <a:avLst/>
+          </a:prstGeom>
+        </p:spPr>
+        <p:style>
+          <a:lnRef idx="2">
+            <a:schemeClr val="accent1">
+              <a:shade val="50000"/>
+            </a:schemeClr>
+          </a:lnRef>
+          <a:fillRef idx="1">
+            <a:schemeClr val="accent1"/>
+          </a:fillRef>
+          <a:effectRef idx="0">
+            <a:schemeClr val="accent1"/>
+          </a:effectRef>
+          <a:fontRef idx="minor">
+            <a:schemeClr val="lt1"/>
+          </a:fontRef>
+        </p:style>
+        <p:txBody>
+          <a:bodyPr rtlCol="0" anchor="ctr"/>
+          <a:lstStyle/>
+          <a:p>
+            <a:pPr algn="ctr"/>
+            <a:r>
+              <a:rPr lang="en-IN" dirty="0"/>
+              <a:t>MY NAME</a:t>
+            </a:r>
+          </a:p>
+        </p:txBody>
+      </p:sp>
+      <p:sp>
+        <p:nvSpPr>
+          <p:cNvPr id="7" name="TextBox 6">
+            <a:extLst>
+              <a:ext uri="{FF2B5EF4-FFF2-40B4-BE49-F238E27FC236}">
+                <a16:creationId xmlns:a16="http://schemas.microsoft.com/office/drawing/2014/main" id="{78F34FE7-92F3-477B-ACAE-43B0DE1EE879}"/>
+              </a:ext>
+            </a:extLst>
+          </p:cNvPr>
+          <p:cNvSpPr txBox="1"/>
+          <p:nvPr/>
+        </p:nvSpPr>
+        <p:spPr>
+          <a:xfrm>
+            <a:off x="2404387" y="420162"/>
+            <a:ext cx="1205523" cy="369332"/>
+          </a:xfrm>
+          <a:prstGeom prst="rect">
+            <a:avLst/>
+          </a:prstGeom>
+          <a:noFill/>
+        </p:spPr>
+        <p:txBody>
+          <a:bodyPr wrap="none" rtlCol="0">
+            <a:spAutoFit/>
+          </a:bodyPr>
+          <a:lstStyle/>
+          <a:p>
+            <a:r>
+              <a:rPr lang="en-IN" dirty="0"/>
+              <a:t>Box Layout</a:t>
+            </a:r>
+          </a:p>
+        </p:txBody>
+      </p:sp>
+      <p:sp>
+        <p:nvSpPr>
+          <p:cNvPr id="8" name="TextBox 7">
+            <a:extLst>
+              <a:ext uri="{FF2B5EF4-FFF2-40B4-BE49-F238E27FC236}">
+                <a16:creationId xmlns:a16="http://schemas.microsoft.com/office/drawing/2014/main" id="{9F12D5D3-AE1F-40F0-B514-632C6120A04E}"/>
+              </a:ext>
+            </a:extLst>
+          </p:cNvPr>
+          <p:cNvSpPr txBox="1"/>
+          <p:nvPr/>
+        </p:nvSpPr>
+        <p:spPr>
+          <a:xfrm>
+            <a:off x="5436677" y="3244334"/>
+            <a:ext cx="1205523" cy="369332"/>
+          </a:xfrm>
+          <a:prstGeom prst="rect">
+            <a:avLst/>
+          </a:prstGeom>
+          <a:noFill/>
+        </p:spPr>
+        <p:txBody>
+          <a:bodyPr wrap="none" rtlCol="0">
+            <a:spAutoFit/>
+          </a:bodyPr>
+          <a:lstStyle/>
+          <a:p>
+            <a:r>
+              <a:rPr lang="en-IN" dirty="0"/>
+              <a:t>Box Layout</a:t>
+            </a:r>
+          </a:p>
+        </p:txBody>
+      </p:sp>
+      <p:cxnSp>
+        <p:nvCxnSpPr>
+          <p:cNvPr id="10" name="Straight Connector 9">
+            <a:extLst>
+              <a:ext uri="{FF2B5EF4-FFF2-40B4-BE49-F238E27FC236}">
+                <a16:creationId xmlns:a16="http://schemas.microsoft.com/office/drawing/2014/main" id="{56EE42C6-72F0-48E8-B76B-586E83D49E5E}"/>
+              </a:ext>
+            </a:extLst>
+          </p:cNvPr>
+          <p:cNvCxnSpPr>
+            <a:cxnSpLocks/>
+            <a:stCxn id="4" idx="3"/>
+          </p:cNvCxnSpPr>
+          <p:nvPr/>
+        </p:nvCxnSpPr>
+        <p:spPr>
+          <a:xfrm>
+            <a:off x="5269582" y="1084083"/>
+            <a:ext cx="769856" cy="0"/>
+          </a:xfrm>
+          <a:prstGeom prst="line">
+            <a:avLst/>
+          </a:prstGeom>
+        </p:spPr>
+        <p:style>
+          <a:lnRef idx="1">
+            <a:schemeClr val="accent1"/>
+          </a:lnRef>
+          <a:fillRef idx="0">
+            <a:schemeClr val="accent1"/>
+          </a:fillRef>
+          <a:effectRef idx="0">
+            <a:schemeClr val="accent1"/>
+          </a:effectRef>
+          <a:fontRef idx="minor">
+            <a:schemeClr val="tx1"/>
+          </a:fontRef>
+        </p:style>
+      </p:cxnSp>
+      <p:cxnSp>
+        <p:nvCxnSpPr>
+          <p:cNvPr id="12" name="Straight Connector 11">
+            <a:extLst>
+              <a:ext uri="{FF2B5EF4-FFF2-40B4-BE49-F238E27FC236}">
+                <a16:creationId xmlns:a16="http://schemas.microsoft.com/office/drawing/2014/main" id="{197F833F-E098-46B7-8003-61B239B0714E}"/>
+              </a:ext>
+            </a:extLst>
+          </p:cNvPr>
+          <p:cNvCxnSpPr>
+            <a:endCxn id="8" idx="0"/>
+          </p:cNvCxnSpPr>
+          <p:nvPr/>
+        </p:nvCxnSpPr>
+        <p:spPr>
+          <a:xfrm>
+            <a:off x="6039438" y="1084082"/>
+            <a:ext cx="1" cy="2160252"/>
+          </a:xfrm>
+          <a:prstGeom prst="line">
+            <a:avLst/>
+          </a:prstGeom>
+        </p:spPr>
+        <p:style>
+          <a:lnRef idx="1">
+            <a:schemeClr val="accent1"/>
+          </a:lnRef>
+          <a:fillRef idx="0">
+            <a:schemeClr val="accent1"/>
+          </a:fillRef>
+          <a:effectRef idx="0">
+            <a:schemeClr val="accent1"/>
+          </a:effectRef>
+          <a:fontRef idx="minor">
+            <a:schemeClr val="tx1"/>
+          </a:fontRef>
+        </p:style>
+      </p:cxnSp>
+      <p:cxnSp>
+        <p:nvCxnSpPr>
+          <p:cNvPr id="14" name="Straight Connector 13">
+            <a:extLst>
+              <a:ext uri="{FF2B5EF4-FFF2-40B4-BE49-F238E27FC236}">
+                <a16:creationId xmlns:a16="http://schemas.microsoft.com/office/drawing/2014/main" id="{A4F712C4-5402-477E-9234-41CCD122E9C5}"/>
+              </a:ext>
+            </a:extLst>
+          </p:cNvPr>
+          <p:cNvCxnSpPr>
+            <a:stCxn id="8" idx="2"/>
+          </p:cNvCxnSpPr>
+          <p:nvPr/>
+        </p:nvCxnSpPr>
+        <p:spPr>
+          <a:xfrm flipH="1">
+            <a:off x="6039437" y="3613666"/>
+            <a:ext cx="2" cy="2263946"/>
+          </a:xfrm>
+          <a:prstGeom prst="line">
+            <a:avLst/>
+          </a:prstGeom>
+        </p:spPr>
+        <p:style>
+          <a:lnRef idx="1">
+            <a:schemeClr val="accent1"/>
+          </a:lnRef>
+          <a:fillRef idx="0">
+            <a:schemeClr val="accent1"/>
+          </a:fillRef>
+          <a:effectRef idx="0">
+            <a:schemeClr val="accent1"/>
+          </a:effectRef>
+          <a:fontRef idx="minor">
+            <a:schemeClr val="tx1"/>
+          </a:fontRef>
+        </p:style>
+      </p:cxnSp>
+      <p:cxnSp>
+        <p:nvCxnSpPr>
+          <p:cNvPr id="16" name="Straight Connector 15">
+            <a:extLst>
+              <a:ext uri="{FF2B5EF4-FFF2-40B4-BE49-F238E27FC236}">
+                <a16:creationId xmlns:a16="http://schemas.microsoft.com/office/drawing/2014/main" id="{25EB339E-94BC-416E-8D95-957ED38F9A8C}"/>
+              </a:ext>
+            </a:extLst>
+          </p:cNvPr>
+          <p:cNvCxnSpPr>
+            <a:cxnSpLocks/>
+            <a:endCxn id="3" idx="3"/>
+          </p:cNvCxnSpPr>
+          <p:nvPr/>
+        </p:nvCxnSpPr>
+        <p:spPr>
+          <a:xfrm flipH="1">
+            <a:off x="5269583" y="5877612"/>
+            <a:ext cx="769856" cy="0"/>
+          </a:xfrm>
+          <a:prstGeom prst="line">
+            <a:avLst/>
+          </a:prstGeom>
+        </p:spPr>
+        <p:style>
+          <a:lnRef idx="1">
+            <a:schemeClr val="accent1"/>
+          </a:lnRef>
+          <a:fillRef idx="0">
+            <a:schemeClr val="accent1"/>
+          </a:fillRef>
+          <a:effectRef idx="0">
+            <a:schemeClr val="accent1"/>
+          </a:effectRef>
+          <a:fontRef idx="minor">
+            <a:schemeClr val="tx1"/>
+          </a:fontRef>
+        </p:style>
+      </p:cxnSp>
+      <p:cxnSp>
+        <p:nvCxnSpPr>
+          <p:cNvPr id="18" name="Straight Connector 17">
+            <a:extLst>
+              <a:ext uri="{FF2B5EF4-FFF2-40B4-BE49-F238E27FC236}">
+                <a16:creationId xmlns:a16="http://schemas.microsoft.com/office/drawing/2014/main" id="{FA8D1C36-FA31-467C-9CF1-1E0D8E3204D0}"/>
+              </a:ext>
+            </a:extLst>
+          </p:cNvPr>
+          <p:cNvCxnSpPr>
+            <a:stCxn id="7" idx="3"/>
+          </p:cNvCxnSpPr>
+          <p:nvPr/>
+        </p:nvCxnSpPr>
+        <p:spPr>
+          <a:xfrm>
+            <a:off x="3609910" y="604828"/>
+            <a:ext cx="528455" cy="0"/>
+          </a:xfrm>
+          <a:prstGeom prst="line">
+            <a:avLst/>
+          </a:prstGeom>
+        </p:spPr>
+        <p:style>
+          <a:lnRef idx="1">
+            <a:schemeClr val="accent1"/>
+          </a:lnRef>
+          <a:fillRef idx="0">
+            <a:schemeClr val="accent1"/>
+          </a:fillRef>
+          <a:effectRef idx="0">
+            <a:schemeClr val="accent1"/>
+          </a:effectRef>
+          <a:fontRef idx="minor">
+            <a:schemeClr val="tx1"/>
+          </a:fontRef>
+        </p:style>
+      </p:cxnSp>
+      <p:cxnSp>
+        <p:nvCxnSpPr>
+          <p:cNvPr id="20" name="Straight Connector 19">
+            <a:extLst>
+              <a:ext uri="{FF2B5EF4-FFF2-40B4-BE49-F238E27FC236}">
+                <a16:creationId xmlns:a16="http://schemas.microsoft.com/office/drawing/2014/main" id="{A493866A-2388-4A07-99F3-1AD76AE21FA8}"/>
+              </a:ext>
+            </a:extLst>
+          </p:cNvPr>
+          <p:cNvCxnSpPr>
+            <a:stCxn id="7" idx="1"/>
+          </p:cNvCxnSpPr>
+          <p:nvPr/>
+        </p:nvCxnSpPr>
+        <p:spPr>
+          <a:xfrm flipH="1">
+            <a:off x="1852366" y="604828"/>
+            <a:ext cx="552021" cy="0"/>
+          </a:xfrm>
+          <a:prstGeom prst="line">
+            <a:avLst/>
+          </a:prstGeom>
+        </p:spPr>
+        <p:style>
+          <a:lnRef idx="1">
+            <a:schemeClr val="accent1"/>
+          </a:lnRef>
+          <a:fillRef idx="0">
+            <a:schemeClr val="accent1"/>
+          </a:fillRef>
+          <a:effectRef idx="0">
+            <a:schemeClr val="accent1"/>
+          </a:effectRef>
+          <a:fontRef idx="minor">
+            <a:schemeClr val="tx1"/>
+          </a:fontRef>
+        </p:style>
+      </p:cxnSp>
+      <p:cxnSp>
+        <p:nvCxnSpPr>
+          <p:cNvPr id="22" name="Straight Connector 21">
+            <a:extLst>
+              <a:ext uri="{FF2B5EF4-FFF2-40B4-BE49-F238E27FC236}">
+                <a16:creationId xmlns:a16="http://schemas.microsoft.com/office/drawing/2014/main" id="{D84BF493-6D3D-47F5-8BA1-804017C9C6CC}"/>
+              </a:ext>
+            </a:extLst>
+          </p:cNvPr>
+          <p:cNvCxnSpPr>
+            <a:endCxn id="5" idx="0"/>
+          </p:cNvCxnSpPr>
+          <p:nvPr/>
+        </p:nvCxnSpPr>
+        <p:spPr>
+          <a:xfrm>
+            <a:off x="1852366" y="604828"/>
+            <a:ext cx="1" cy="198807"/>
+          </a:xfrm>
+          <a:prstGeom prst="line">
+            <a:avLst/>
+          </a:prstGeom>
+        </p:spPr>
+        <p:style>
+          <a:lnRef idx="1">
+            <a:schemeClr val="accent1"/>
+          </a:lnRef>
+          <a:fillRef idx="0">
+            <a:schemeClr val="accent1"/>
+          </a:fillRef>
+          <a:effectRef idx="0">
+            <a:schemeClr val="accent1"/>
+          </a:effectRef>
+          <a:fontRef idx="minor">
+            <a:schemeClr val="tx1"/>
+          </a:fontRef>
+        </p:style>
+      </p:cxnSp>
+      <p:cxnSp>
+        <p:nvCxnSpPr>
+          <p:cNvPr id="24" name="Straight Connector 23">
+            <a:extLst>
+              <a:ext uri="{FF2B5EF4-FFF2-40B4-BE49-F238E27FC236}">
+                <a16:creationId xmlns:a16="http://schemas.microsoft.com/office/drawing/2014/main" id="{B263BC97-6B11-4761-ABB0-DCFECFB8E034}"/>
+              </a:ext>
+            </a:extLst>
+          </p:cNvPr>
+          <p:cNvCxnSpPr>
+            <a:cxnSpLocks/>
+            <a:endCxn id="4" idx="0"/>
+          </p:cNvCxnSpPr>
+          <p:nvPr/>
+        </p:nvCxnSpPr>
+        <p:spPr>
+          <a:xfrm>
+            <a:off x="4138365" y="604828"/>
+            <a:ext cx="1" cy="198807"/>
+          </a:xfrm>
+          <a:prstGeom prst="line">
+            <a:avLst/>
+          </a:prstGeom>
+        </p:spPr>
+        <p:style>
+          <a:lnRef idx="1">
+            <a:schemeClr val="accent1"/>
+          </a:lnRef>
+          <a:fillRef idx="0">
+            <a:schemeClr val="accent1"/>
+          </a:fillRef>
+          <a:effectRef idx="0">
+            <a:schemeClr val="accent1"/>
+          </a:effectRef>
+          <a:fontRef idx="minor">
+            <a:schemeClr val="tx1"/>
+          </a:fontRef>
+        </p:style>
+      </p:cxnSp>
+      <p:cxnSp>
+        <p:nvCxnSpPr>
+          <p:cNvPr id="32" name="Straight Connector 31">
+            <a:extLst>
+              <a:ext uri="{FF2B5EF4-FFF2-40B4-BE49-F238E27FC236}">
+                <a16:creationId xmlns:a16="http://schemas.microsoft.com/office/drawing/2014/main" id="{4FDC37F3-937F-4A64-B668-6B086ABBED0B}"/>
+              </a:ext>
+            </a:extLst>
+          </p:cNvPr>
+          <p:cNvCxnSpPr>
+            <a:stCxn id="8" idx="1"/>
+            <a:endCxn id="2" idx="3"/>
+          </p:cNvCxnSpPr>
+          <p:nvPr/>
+        </p:nvCxnSpPr>
+        <p:spPr>
+          <a:xfrm flipH="1">
+            <a:off x="5269583" y="3429000"/>
+            <a:ext cx="167094" cy="0"/>
+          </a:xfrm>
+          <a:prstGeom prst="line">
+            <a:avLst/>
+          </a:prstGeom>
+        </p:spPr>
+        <p:style>
+          <a:lnRef idx="1">
+            <a:schemeClr val="accent1"/>
+          </a:lnRef>
+          <a:fillRef idx="0">
+            <a:schemeClr val="accent1"/>
+          </a:fillRef>
+          <a:effectRef idx="0">
+            <a:schemeClr val="accent1"/>
+          </a:effectRef>
+          <a:fontRef idx="minor">
+            <a:schemeClr val="tx1"/>
+          </a:fontRef>
+        </p:style>
+      </p:cxnSp>
+      <p:sp>
+        <p:nvSpPr>
+          <p:cNvPr id="33" name="TextBox 32">
+            <a:extLst>
+              <a:ext uri="{FF2B5EF4-FFF2-40B4-BE49-F238E27FC236}">
+                <a16:creationId xmlns:a16="http://schemas.microsoft.com/office/drawing/2014/main" id="{EB94DC64-6AEF-406C-80F3-EB7EBE548A86}"/>
+              </a:ext>
+            </a:extLst>
+          </p:cNvPr>
+          <p:cNvSpPr txBox="1"/>
+          <p:nvPr/>
+        </p:nvSpPr>
+        <p:spPr>
+          <a:xfrm>
+            <a:off x="2225278" y="6144762"/>
+            <a:ext cx="1205523" cy="369332"/>
+          </a:xfrm>
+          <a:prstGeom prst="rect">
+            <a:avLst/>
+          </a:prstGeom>
+          <a:noFill/>
+        </p:spPr>
+        <p:txBody>
+          <a:bodyPr wrap="none" rtlCol="0">
+            <a:spAutoFit/>
+          </a:bodyPr>
+          <a:lstStyle/>
+          <a:p>
+            <a:r>
+              <a:rPr lang="en-IN" dirty="0"/>
+              <a:t>Box Layout</a:t>
+            </a:r>
+          </a:p>
+        </p:txBody>
+      </p:sp>
+      <p:cxnSp>
+        <p:nvCxnSpPr>
+          <p:cNvPr id="34" name="Straight Connector 33">
+            <a:extLst>
+              <a:ext uri="{FF2B5EF4-FFF2-40B4-BE49-F238E27FC236}">
+                <a16:creationId xmlns:a16="http://schemas.microsoft.com/office/drawing/2014/main" id="{A4900E5C-3311-45FF-BA82-3A8421FE6E6D}"/>
+              </a:ext>
+            </a:extLst>
+          </p:cNvPr>
+          <p:cNvCxnSpPr>
+            <a:stCxn id="33" idx="3"/>
+          </p:cNvCxnSpPr>
+          <p:nvPr/>
+        </p:nvCxnSpPr>
+        <p:spPr>
+          <a:xfrm>
+            <a:off x="3430801" y="6329428"/>
+            <a:ext cx="528455" cy="0"/>
+          </a:xfrm>
+          <a:prstGeom prst="line">
+            <a:avLst/>
+          </a:prstGeom>
+        </p:spPr>
+        <p:style>
+          <a:lnRef idx="1">
+            <a:schemeClr val="accent1"/>
+          </a:lnRef>
+          <a:fillRef idx="0">
+            <a:schemeClr val="accent1"/>
+          </a:fillRef>
+          <a:effectRef idx="0">
+            <a:schemeClr val="accent1"/>
+          </a:effectRef>
+          <a:fontRef idx="minor">
+            <a:schemeClr val="tx1"/>
+          </a:fontRef>
+        </p:style>
+      </p:cxnSp>
+      <p:cxnSp>
+        <p:nvCxnSpPr>
+          <p:cNvPr id="35" name="Straight Connector 34">
+            <a:extLst>
+              <a:ext uri="{FF2B5EF4-FFF2-40B4-BE49-F238E27FC236}">
+                <a16:creationId xmlns:a16="http://schemas.microsoft.com/office/drawing/2014/main" id="{15B2A351-1922-4A09-9463-088CADB6A4D6}"/>
+              </a:ext>
+            </a:extLst>
+          </p:cNvPr>
+          <p:cNvCxnSpPr>
+            <a:cxnSpLocks/>
+            <a:stCxn id="33" idx="1"/>
+          </p:cNvCxnSpPr>
+          <p:nvPr/>
+        </p:nvCxnSpPr>
+        <p:spPr>
+          <a:xfrm flipH="1">
+            <a:off x="1319751" y="6329428"/>
+            <a:ext cx="905527" cy="0"/>
+          </a:xfrm>
+          <a:prstGeom prst="line">
+            <a:avLst/>
+          </a:prstGeom>
+        </p:spPr>
+        <p:style>
+          <a:lnRef idx="1">
+            <a:schemeClr val="accent1"/>
+          </a:lnRef>
+          <a:fillRef idx="0">
+            <a:schemeClr val="accent1"/>
+          </a:fillRef>
+          <a:effectRef idx="0">
+            <a:schemeClr val="accent1"/>
+          </a:effectRef>
+          <a:fontRef idx="minor">
+            <a:schemeClr val="tx1"/>
+          </a:fontRef>
+        </p:style>
+      </p:cxnSp>
+      <p:cxnSp>
+        <p:nvCxnSpPr>
+          <p:cNvPr id="37" name="Straight Connector 36">
+            <a:extLst>
+              <a:ext uri="{FF2B5EF4-FFF2-40B4-BE49-F238E27FC236}">
+                <a16:creationId xmlns:a16="http://schemas.microsoft.com/office/drawing/2014/main" id="{D1747DAD-4A23-4BC0-A032-F2997E80C26B}"/>
+              </a:ext>
+            </a:extLst>
+          </p:cNvPr>
+          <p:cNvCxnSpPr>
+            <a:stCxn id="6" idx="2"/>
+          </p:cNvCxnSpPr>
+          <p:nvPr/>
+        </p:nvCxnSpPr>
+        <p:spPr>
+          <a:xfrm>
+            <a:off x="1319751" y="6040225"/>
+            <a:ext cx="1" cy="289203"/>
+          </a:xfrm>
+          <a:prstGeom prst="line">
+            <a:avLst/>
+          </a:prstGeom>
+        </p:spPr>
+        <p:style>
+          <a:lnRef idx="1">
+            <a:schemeClr val="accent1"/>
+          </a:lnRef>
+          <a:fillRef idx="0">
+            <a:schemeClr val="accent1"/>
+          </a:fillRef>
+          <a:effectRef idx="0">
+            <a:schemeClr val="accent1"/>
+          </a:effectRef>
+          <a:fontRef idx="minor">
+            <a:schemeClr val="tx1"/>
+          </a:fontRef>
+        </p:style>
+      </p:cxnSp>
+      <p:cxnSp>
+        <p:nvCxnSpPr>
+          <p:cNvPr id="40" name="Straight Connector 39">
+            <a:extLst>
+              <a:ext uri="{FF2B5EF4-FFF2-40B4-BE49-F238E27FC236}">
+                <a16:creationId xmlns:a16="http://schemas.microsoft.com/office/drawing/2014/main" id="{B89320AD-3F7F-4577-8EB2-E4ED556A0AB3}"/>
+              </a:ext>
+            </a:extLst>
+          </p:cNvPr>
+          <p:cNvCxnSpPr/>
+          <p:nvPr/>
+        </p:nvCxnSpPr>
+        <p:spPr>
+          <a:xfrm flipV="1">
+            <a:off x="3959256" y="6040224"/>
+            <a:ext cx="0" cy="289204"/>
+          </a:xfrm>
+          <a:prstGeom prst="line">
+            <a:avLst/>
+          </a:prstGeom>
+        </p:spPr>
+        <p:style>
+          <a:lnRef idx="1">
+            <a:schemeClr val="accent1"/>
+          </a:lnRef>
+          <a:fillRef idx="0">
+            <a:schemeClr val="accent1"/>
+          </a:fillRef>
+          <a:effectRef idx="0">
+            <a:schemeClr val="accent1"/>
+          </a:effectRef>
+          <a:fontRef idx="minor">
+            <a:schemeClr val="tx1"/>
+          </a:fontRef>
+        </p:style>
+      </p:cxnSp>
+      <p:sp>
+        <p:nvSpPr>
+          <p:cNvPr id="41" name="TextBox 40">
+            <a:extLst>
+              <a:ext uri="{FF2B5EF4-FFF2-40B4-BE49-F238E27FC236}">
+                <a16:creationId xmlns:a16="http://schemas.microsoft.com/office/drawing/2014/main" id="{72C6A621-A742-426B-936D-CAC37AA9DD79}"/>
+              </a:ext>
+            </a:extLst>
+          </p:cNvPr>
+          <p:cNvSpPr txBox="1"/>
+          <p:nvPr/>
+        </p:nvSpPr>
+        <p:spPr>
+          <a:xfrm>
+            <a:off x="919800" y="5359808"/>
+            <a:ext cx="799899" cy="369332"/>
+          </a:xfrm>
+          <a:prstGeom prst="rect">
+            <a:avLst/>
+          </a:prstGeom>
+          <a:noFill/>
+        </p:spPr>
+        <p:txBody>
+          <a:bodyPr wrap="none" rtlCol="0">
+            <a:spAutoFit/>
+          </a:bodyPr>
+          <a:lstStyle/>
+          <a:p>
+            <a:r>
+              <a:rPr lang="en-IN" dirty="0"/>
+              <a:t>corner</a:t>
+            </a:r>
+          </a:p>
+        </p:txBody>
+      </p:sp>
+      <p:sp>
+        <p:nvSpPr>
+          <p:cNvPr id="42" name="TextBox 41">
+            <a:extLst>
+              <a:ext uri="{FF2B5EF4-FFF2-40B4-BE49-F238E27FC236}">
+                <a16:creationId xmlns:a16="http://schemas.microsoft.com/office/drawing/2014/main" id="{12C85A41-2984-4DFF-B505-003C81903287}"/>
+              </a:ext>
+            </a:extLst>
+          </p:cNvPr>
+          <p:cNvSpPr txBox="1"/>
+          <p:nvPr/>
+        </p:nvSpPr>
+        <p:spPr>
+          <a:xfrm>
+            <a:off x="2691676" y="1454927"/>
+            <a:ext cx="583814" cy="369332"/>
+          </a:xfrm>
+          <a:prstGeom prst="rect">
+            <a:avLst/>
+          </a:prstGeom>
+          <a:noFill/>
+        </p:spPr>
+        <p:txBody>
+          <a:bodyPr wrap="none" rtlCol="0">
+            <a:spAutoFit/>
+          </a:bodyPr>
+          <a:lstStyle/>
+          <a:p>
+            <a:r>
+              <a:rPr lang="en-IN" dirty="0"/>
+              <a:t>50%</a:t>
+            </a:r>
+          </a:p>
+        </p:txBody>
+      </p:sp>
+      <p:sp>
+        <p:nvSpPr>
+          <p:cNvPr id="43" name="TextBox 42">
+            <a:extLst>
+              <a:ext uri="{FF2B5EF4-FFF2-40B4-BE49-F238E27FC236}">
+                <a16:creationId xmlns:a16="http://schemas.microsoft.com/office/drawing/2014/main" id="{3601F9D4-5193-4BB1-9D1D-8FE7D65C19BC}"/>
+              </a:ext>
+            </a:extLst>
+          </p:cNvPr>
+          <p:cNvSpPr txBox="1"/>
+          <p:nvPr/>
+        </p:nvSpPr>
+        <p:spPr>
+          <a:xfrm>
+            <a:off x="6642199" y="704231"/>
+            <a:ext cx="2266261" cy="523220"/>
+          </a:xfrm>
+          <a:prstGeom prst="rect">
+            <a:avLst/>
+          </a:prstGeom>
+          <a:noFill/>
+        </p:spPr>
+        <p:txBody>
+          <a:bodyPr wrap="none" rtlCol="0">
+            <a:spAutoFit/>
+          </a:bodyPr>
+          <a:lstStyle/>
+          <a:p>
+            <a:r>
+              <a:rPr lang="en-IN" sz="2800" b="1" dirty="0"/>
+              <a:t>Layout Design</a:t>
+            </a:r>
+          </a:p>
+        </p:txBody>
+      </p:sp>
+    </p:spTree>
+    <p:extLst>
+      <p:ext uri="{BB962C8B-B14F-4D97-AF65-F5344CB8AC3E}">
+        <p14:creationId xmlns:p14="http://schemas.microsoft.com/office/powerpoint/2010/main" val="4023034115"/>
       </p:ext>
     </p:extLst>
   </p:cSld>

</xml_diff>

<commit_message>
Resized banner to proper size
</commit_message>
<xml_diff>
--- a/res/src.pptx
+++ b/res/src.pptx
@@ -4095,6 +4095,41 @@
           </a:prstGeom>
         </p:spPr>
       </p:pic>
+      <p:pic>
+        <p:nvPicPr>
+          <p:cNvPr id="5" name="Picture 4">
+            <a:extLst>
+              <a:ext uri="{FF2B5EF4-FFF2-40B4-BE49-F238E27FC236}">
+                <a16:creationId xmlns:a16="http://schemas.microsoft.com/office/drawing/2014/main" id="{A87BC21B-B00E-48DD-8ED6-A5B3702B5AE9}"/>
+              </a:ext>
+            </a:extLst>
+          </p:cNvPr>
+          <p:cNvPicPr>
+            <a:picLocks noChangeAspect="1"/>
+          </p:cNvPicPr>
+          <p:nvPr/>
+        </p:nvPicPr>
+        <p:blipFill rotWithShape="1">
+          <a:blip r:embed="rId2">
+            <a:extLst>
+              <a:ext uri="{28A0092B-C50C-407E-A947-70E740481C1C}">
+                <a14:useLocalDpi xmlns:a14="http://schemas.microsoft.com/office/drawing/2010/main" val="0"/>
+              </a:ext>
+            </a:extLst>
+          </a:blip>
+          <a:srcRect l="2192" t="16649" r="10341" b="28660"/>
+          <a:stretch/>
+        </p:blipFill>
+        <p:spPr>
+          <a:xfrm>
+            <a:off x="6262540" y="5086712"/>
+            <a:ext cx="2966302" cy="694094"/>
+          </a:xfrm>
+          <a:prstGeom prst="rect">
+            <a:avLst/>
+          </a:prstGeom>
+        </p:spPr>
+      </p:pic>
     </p:spTree>
     <p:extLst>
       <p:ext uri="{BB962C8B-B14F-4D97-AF65-F5344CB8AC3E}">

</xml_diff>

<commit_message>
Fixed buildozer command and banner, icon for game
</commit_message>
<xml_diff>
--- a/res/src.pptx
+++ b/res/src.pptx
@@ -7,8 +7,9 @@
   <p:sldIdLst>
     <p:sldId id="256" r:id="rId2"/>
     <p:sldId id="257" r:id="rId3"/>
-    <p:sldId id="258" r:id="rId4"/>
-    <p:sldId id="259" r:id="rId5"/>
+    <p:sldId id="260" r:id="rId4"/>
+    <p:sldId id="258" r:id="rId5"/>
+    <p:sldId id="259" r:id="rId6"/>
   </p:sldIdLst>
   <p:sldSz cx="12192000" cy="6858000"/>
   <p:notesSz cx="6858000" cy="9144000"/>
@@ -4130,6 +4131,89 @@
           </a:prstGeom>
         </p:spPr>
       </p:pic>
+      <p:pic>
+        <p:nvPicPr>
+          <p:cNvPr id="6" name="Picture 5">
+            <a:extLst>
+              <a:ext uri="{FF2B5EF4-FFF2-40B4-BE49-F238E27FC236}">
+                <a16:creationId xmlns:a16="http://schemas.microsoft.com/office/drawing/2014/main" id="{7073B416-74F6-4AED-AAA4-504D3580F8B4}"/>
+              </a:ext>
+            </a:extLst>
+          </p:cNvPr>
+          <p:cNvPicPr>
+            <a:picLocks noChangeAspect="1"/>
+          </p:cNvPicPr>
+          <p:nvPr/>
+        </p:nvPicPr>
+        <p:blipFill>
+          <a:blip r:embed="rId4">
+            <a:extLst>
+              <a:ext uri="{28A0092B-C50C-407E-A947-70E740481C1C}">
+                <a14:useLocalDpi xmlns:a14="http://schemas.microsoft.com/office/drawing/2010/main" val="0"/>
+              </a:ext>
+            </a:extLst>
+          </a:blip>
+          <a:stretch>
+            <a:fillRect/>
+          </a:stretch>
+        </p:blipFill>
+        <p:spPr>
+          <a:xfrm>
+            <a:off x="4069185" y="370547"/>
+            <a:ext cx="1564951" cy="2006819"/>
+          </a:xfrm>
+          <a:prstGeom prst="rect">
+            <a:avLst/>
+          </a:prstGeom>
+        </p:spPr>
+      </p:pic>
+      <p:sp>
+        <p:nvSpPr>
+          <p:cNvPr id="7" name="Rectangle 6">
+            <a:extLst>
+              <a:ext uri="{FF2B5EF4-FFF2-40B4-BE49-F238E27FC236}">
+                <a16:creationId xmlns:a16="http://schemas.microsoft.com/office/drawing/2014/main" id="{6CF6921B-F8D2-49BC-AFD3-45A8110867A5}"/>
+              </a:ext>
+            </a:extLst>
+          </p:cNvPr>
+          <p:cNvSpPr/>
+          <p:nvPr/>
+        </p:nvSpPr>
+        <p:spPr>
+          <a:xfrm>
+            <a:off x="6262540" y="442787"/>
+            <a:ext cx="2488677" cy="2102177"/>
+          </a:xfrm>
+          <a:prstGeom prst="rect">
+            <a:avLst/>
+          </a:prstGeom>
+          <a:ln>
+            <a:noFill/>
+          </a:ln>
+        </p:spPr>
+        <p:style>
+          <a:lnRef idx="2">
+            <a:schemeClr val="dk1"/>
+          </a:lnRef>
+          <a:fillRef idx="1">
+            <a:schemeClr val="lt1"/>
+          </a:fillRef>
+          <a:effectRef idx="0">
+            <a:schemeClr val="dk1"/>
+          </a:effectRef>
+          <a:fontRef idx="minor">
+            <a:schemeClr val="dk1"/>
+          </a:fontRef>
+        </p:style>
+        <p:txBody>
+          <a:bodyPr rtlCol="0" anchor="ctr"/>
+          <a:lstStyle/>
+          <a:p>
+            <a:pPr algn="ctr"/>
+            <a:endParaRPr lang="en-IN"/>
+          </a:p>
+        </p:txBody>
+      </p:sp>
     </p:spTree>
     <p:extLst>
       <p:ext uri="{BB962C8B-B14F-4D97-AF65-F5344CB8AC3E}">
@@ -4144,6 +4228,171 @@
 </file>
 
 <file path=ppt/slides/slide3.xml><?xml version="1.0" encoding="utf-8"?>
+<p:sld xmlns:a="http://schemas.openxmlformats.org/drawingml/2006/main" xmlns:r="http://schemas.openxmlformats.org/officeDocument/2006/relationships" xmlns:p="http://schemas.openxmlformats.org/presentationml/2006/main">
+  <p:cSld>
+    <p:bg>
+      <p:bgPr>
+        <a:solidFill>
+          <a:schemeClr val="tx1"/>
+        </a:solidFill>
+        <a:effectLst/>
+      </p:bgPr>
+    </p:bg>
+    <p:spTree>
+      <p:nvGrpSpPr>
+        <p:cNvPr id="1" name=""/>
+        <p:cNvGrpSpPr/>
+        <p:nvPr/>
+      </p:nvGrpSpPr>
+      <p:grpSpPr>
+        <a:xfrm>
+          <a:off x="0" y="0"/>
+          <a:ext cx="0" cy="0"/>
+          <a:chOff x="0" y="0"/>
+          <a:chExt cx="0" cy="0"/>
+        </a:xfrm>
+      </p:grpSpPr>
+      <p:sp>
+        <p:nvSpPr>
+          <p:cNvPr id="7" name="Rectangle 6">
+            <a:extLst>
+              <a:ext uri="{FF2B5EF4-FFF2-40B4-BE49-F238E27FC236}">
+                <a16:creationId xmlns:a16="http://schemas.microsoft.com/office/drawing/2014/main" id="{6CF6921B-F8D2-49BC-AFD3-45A8110867A5}"/>
+              </a:ext>
+            </a:extLst>
+          </p:cNvPr>
+          <p:cNvSpPr/>
+          <p:nvPr/>
+        </p:nvSpPr>
+        <p:spPr>
+          <a:xfrm>
+            <a:off x="3245962" y="940187"/>
+            <a:ext cx="5520965" cy="4977626"/>
+          </a:xfrm>
+          <a:prstGeom prst="rect">
+            <a:avLst/>
+          </a:prstGeom>
+          <a:ln>
+            <a:noFill/>
+          </a:ln>
+        </p:spPr>
+        <p:style>
+          <a:lnRef idx="2">
+            <a:schemeClr val="dk1"/>
+          </a:lnRef>
+          <a:fillRef idx="1">
+            <a:schemeClr val="lt1"/>
+          </a:fillRef>
+          <a:effectRef idx="0">
+            <a:schemeClr val="dk1"/>
+          </a:effectRef>
+          <a:fontRef idx="minor">
+            <a:schemeClr val="dk1"/>
+          </a:fontRef>
+        </p:style>
+        <p:txBody>
+          <a:bodyPr rtlCol="0" anchor="ctr"/>
+          <a:lstStyle/>
+          <a:p>
+            <a:pPr algn="ctr"/>
+            <a:endParaRPr lang="en-IN"/>
+          </a:p>
+        </p:txBody>
+      </p:sp>
+      <p:pic>
+        <p:nvPicPr>
+          <p:cNvPr id="6" name="Picture 5">
+            <a:extLst>
+              <a:ext uri="{FF2B5EF4-FFF2-40B4-BE49-F238E27FC236}">
+                <a16:creationId xmlns:a16="http://schemas.microsoft.com/office/drawing/2014/main" id="{7073B416-74F6-4AED-AAA4-504D3580F8B4}"/>
+              </a:ext>
+            </a:extLst>
+          </p:cNvPr>
+          <p:cNvPicPr>
+            <a:picLocks noChangeAspect="1"/>
+          </p:cNvPicPr>
+          <p:nvPr/>
+        </p:nvPicPr>
+        <p:blipFill>
+          <a:blip r:embed="rId2">
+            <a:extLst>
+              <a:ext uri="{28A0092B-C50C-407E-A947-70E740481C1C}">
+                <a14:useLocalDpi xmlns:a14="http://schemas.microsoft.com/office/drawing/2010/main" val="0"/>
+              </a:ext>
+            </a:extLst>
+          </a:blip>
+          <a:stretch>
+            <a:fillRect/>
+          </a:stretch>
+        </p:blipFill>
+        <p:spPr>
+          <a:xfrm>
+            <a:off x="5480112" y="2818957"/>
+            <a:ext cx="1052664" cy="1220086"/>
+          </a:xfrm>
+          <a:prstGeom prst="rect">
+            <a:avLst/>
+          </a:prstGeom>
+        </p:spPr>
+      </p:pic>
+      <p:sp>
+        <p:nvSpPr>
+          <p:cNvPr id="3" name="TextBox 2">
+            <a:extLst>
+              <a:ext uri="{FF2B5EF4-FFF2-40B4-BE49-F238E27FC236}">
+                <a16:creationId xmlns:a16="http://schemas.microsoft.com/office/drawing/2014/main" id="{E109551D-64D9-40BF-8044-FF9312D302E6}"/>
+              </a:ext>
+            </a:extLst>
+          </p:cNvPr>
+          <p:cNvSpPr txBox="1"/>
+          <p:nvPr/>
+        </p:nvSpPr>
+        <p:spPr>
+          <a:xfrm>
+            <a:off x="5554730" y="348791"/>
+            <a:ext cx="1082540" cy="369332"/>
+          </a:xfrm>
+          <a:prstGeom prst="rect">
+            <a:avLst/>
+          </a:prstGeom>
+          <a:noFill/>
+        </p:spPr>
+        <p:txBody>
+          <a:bodyPr wrap="none" rtlCol="0">
+            <a:spAutoFit/>
+          </a:bodyPr>
+          <a:lstStyle/>
+          <a:p>
+            <a:r>
+              <a:rPr lang="en-IN" dirty="0" err="1">
+                <a:solidFill>
+                  <a:schemeClr val="bg1"/>
+                </a:solidFill>
+              </a:rPr>
+              <a:t>Presplash</a:t>
+            </a:r>
+            <a:endParaRPr lang="en-IN" dirty="0">
+              <a:solidFill>
+                <a:schemeClr val="bg1"/>
+              </a:solidFill>
+            </a:endParaRPr>
+          </a:p>
+        </p:txBody>
+      </p:sp>
+    </p:spTree>
+    <p:extLst>
+      <p:ext uri="{BB962C8B-B14F-4D97-AF65-F5344CB8AC3E}">
+        <p14:creationId xmlns:p14="http://schemas.microsoft.com/office/powerpoint/2010/main" val="2772131519"/>
+      </p:ext>
+    </p:extLst>
+  </p:cSld>
+  <p:clrMapOvr>
+    <a:masterClrMapping/>
+  </p:clrMapOvr>
+</p:sld>
+</file>
+
+<file path=ppt/slides/slide4.xml><?xml version="1.0" encoding="utf-8"?>
 <p:sld xmlns:a="http://schemas.openxmlformats.org/drawingml/2006/main" xmlns:r="http://schemas.openxmlformats.org/officeDocument/2006/relationships" xmlns:p="http://schemas.openxmlformats.org/presentationml/2006/main">
   <p:cSld>
     <p:spTree>
@@ -5024,7 +5273,7 @@
 </p:sld>
 </file>
 
-<file path=ppt/slides/slide4.xml><?xml version="1.0" encoding="utf-8"?>
+<file path=ppt/slides/slide5.xml><?xml version="1.0" encoding="utf-8"?>
 <p:sld xmlns:a="http://schemas.openxmlformats.org/drawingml/2006/main" xmlns:r="http://schemas.openxmlformats.org/officeDocument/2006/relationships" xmlns:p="http://schemas.openxmlformats.org/presentationml/2006/main">
   <p:cSld>
     <p:spTree>

</xml_diff>

<commit_message>
Mobile layout sizing support & Notes in main.py
</commit_message>
<xml_diff>
--- a/res/src.pptx
+++ b/res/src.pptx
@@ -265,7 +265,7 @@
           <a:p>
             <a:fld id="{1F69E956-9DF8-40BC-AA34-E8E7651DDDA9}" type="datetimeFigureOut">
               <a:rPr lang="en-IN" smtClean="0"/>
-              <a:t>12-01-2020</a:t>
+              <a:t>14-01-2020</a:t>
             </a:fld>
             <a:endParaRPr lang="en-IN"/>
           </a:p>
@@ -465,7 +465,7 @@
           <a:p>
             <a:fld id="{1F69E956-9DF8-40BC-AA34-E8E7651DDDA9}" type="datetimeFigureOut">
               <a:rPr lang="en-IN" smtClean="0"/>
-              <a:t>12-01-2020</a:t>
+              <a:t>14-01-2020</a:t>
             </a:fld>
             <a:endParaRPr lang="en-IN"/>
           </a:p>
@@ -675,7 +675,7 @@
           <a:p>
             <a:fld id="{1F69E956-9DF8-40BC-AA34-E8E7651DDDA9}" type="datetimeFigureOut">
               <a:rPr lang="en-IN" smtClean="0"/>
-              <a:t>12-01-2020</a:t>
+              <a:t>14-01-2020</a:t>
             </a:fld>
             <a:endParaRPr lang="en-IN"/>
           </a:p>
@@ -875,7 +875,7 @@
           <a:p>
             <a:fld id="{1F69E956-9DF8-40BC-AA34-E8E7651DDDA9}" type="datetimeFigureOut">
               <a:rPr lang="en-IN" smtClean="0"/>
-              <a:t>12-01-2020</a:t>
+              <a:t>14-01-2020</a:t>
             </a:fld>
             <a:endParaRPr lang="en-IN"/>
           </a:p>
@@ -1151,7 +1151,7 @@
           <a:p>
             <a:fld id="{1F69E956-9DF8-40BC-AA34-E8E7651DDDA9}" type="datetimeFigureOut">
               <a:rPr lang="en-IN" smtClean="0"/>
-              <a:t>12-01-2020</a:t>
+              <a:t>14-01-2020</a:t>
             </a:fld>
             <a:endParaRPr lang="en-IN"/>
           </a:p>
@@ -1419,7 +1419,7 @@
           <a:p>
             <a:fld id="{1F69E956-9DF8-40BC-AA34-E8E7651DDDA9}" type="datetimeFigureOut">
               <a:rPr lang="en-IN" smtClean="0"/>
-              <a:t>12-01-2020</a:t>
+              <a:t>14-01-2020</a:t>
             </a:fld>
             <a:endParaRPr lang="en-IN"/>
           </a:p>
@@ -1834,7 +1834,7 @@
           <a:p>
             <a:fld id="{1F69E956-9DF8-40BC-AA34-E8E7651DDDA9}" type="datetimeFigureOut">
               <a:rPr lang="en-IN" smtClean="0"/>
-              <a:t>12-01-2020</a:t>
+              <a:t>14-01-2020</a:t>
             </a:fld>
             <a:endParaRPr lang="en-IN"/>
           </a:p>
@@ -1976,7 +1976,7 @@
           <a:p>
             <a:fld id="{1F69E956-9DF8-40BC-AA34-E8E7651DDDA9}" type="datetimeFigureOut">
               <a:rPr lang="en-IN" smtClean="0"/>
-              <a:t>12-01-2020</a:t>
+              <a:t>14-01-2020</a:t>
             </a:fld>
             <a:endParaRPr lang="en-IN"/>
           </a:p>
@@ -2089,7 +2089,7 @@
           <a:p>
             <a:fld id="{1F69E956-9DF8-40BC-AA34-E8E7651DDDA9}" type="datetimeFigureOut">
               <a:rPr lang="en-IN" smtClean="0"/>
-              <a:t>12-01-2020</a:t>
+              <a:t>14-01-2020</a:t>
             </a:fld>
             <a:endParaRPr lang="en-IN"/>
           </a:p>
@@ -2402,7 +2402,7 @@
           <a:p>
             <a:fld id="{1F69E956-9DF8-40BC-AA34-E8E7651DDDA9}" type="datetimeFigureOut">
               <a:rPr lang="en-IN" smtClean="0"/>
-              <a:t>12-01-2020</a:t>
+              <a:t>14-01-2020</a:t>
             </a:fld>
             <a:endParaRPr lang="en-IN"/>
           </a:p>
@@ -2691,7 +2691,7 @@
           <a:p>
             <a:fld id="{1F69E956-9DF8-40BC-AA34-E8E7651DDDA9}" type="datetimeFigureOut">
               <a:rPr lang="en-IN" smtClean="0"/>
-              <a:t>12-01-2020</a:t>
+              <a:t>14-01-2020</a:t>
             </a:fld>
             <a:endParaRPr lang="en-IN"/>
           </a:p>
@@ -2934,7 +2934,7 @@
           <a:p>
             <a:fld id="{1F69E956-9DF8-40BC-AA34-E8E7651DDDA9}" type="datetimeFigureOut">
               <a:rPr lang="en-IN" smtClean="0"/>
-              <a:t>12-01-2020</a:t>
+              <a:t>14-01-2020</a:t>
             </a:fld>
             <a:endParaRPr lang="en-IN"/>
           </a:p>

</xml_diff>